<commit_message>
proper photos in tests
</commit_message>
<xml_diff>
--- a/azure-functions/examples/Mustermann, Max DE_190130.pptx
+++ b/azure-functions/examples/Mustermann, Max DE_190130.pptx
@@ -371,7 +371,7 @@
             <a:fld id="{24523C93-84C8-404C-9343-A87C958A5467}" type="datetimeFigureOut">
               <a:rPr lang="de-DE" smtClean="0"/>
               <a:pPr/>
-              <a:t>30.05.25</a:t>
+              <a:t>12.06.25</a:t>
             </a:fld>
             <a:endParaRPr lang="de-DE" dirty="0"/>
           </a:p>
@@ -785,7 +785,7 @@
             <a:fld id="{24523C93-84C8-404C-9343-A87C958A5467}" type="datetimeFigureOut">
               <a:rPr lang="de-DE" smtClean="0"/>
               <a:pPr/>
-              <a:t>30.05.25</a:t>
+              <a:t>12.06.25</a:t>
             </a:fld>
             <a:endParaRPr lang="de-DE" dirty="0"/>
           </a:p>
@@ -1161,7 +1161,7 @@
             <a:fld id="{A52889C9-2E37-46FD-9AE7-6AD1A01DBAD7}" type="datetime1">
               <a:rPr lang="de-DE" smtClean="0"/>
               <a:pPr/>
-              <a:t>30.05.25</a:t>
+              <a:t>12.06.25</a:t>
             </a:fld>
             <a:endParaRPr lang="de-DE" dirty="0"/>
           </a:p>
@@ -1294,7 +1294,7 @@
             <a:fld id="{A52889C9-2E37-46FD-9AE7-6AD1A01DBAD7}" type="datetime1">
               <a:rPr lang="de-DE" smtClean="0"/>
               <a:pPr/>
-              <a:t>30.05.25</a:t>
+              <a:t>12.06.25</a:t>
             </a:fld>
             <a:endParaRPr lang="de-DE" dirty="0"/>
           </a:p>
@@ -1427,7 +1427,7 @@
             <a:fld id="{A52889C9-2E37-46FD-9AE7-6AD1A01DBAD7}" type="datetime1">
               <a:rPr lang="de-DE" smtClean="0"/>
               <a:pPr/>
-              <a:t>30.05.25</a:t>
+              <a:t>12.06.25</a:t>
             </a:fld>
             <a:endParaRPr lang="de-DE" dirty="0"/>
           </a:p>
@@ -2264,7 +2264,7 @@
             <a:fld id="{207F274F-E4AE-45D1-8462-735FF203E3CB}" type="datetime1">
               <a:rPr lang="de-DE" smtClean="0"/>
               <a:pPr/>
-              <a:t>30.05.25</a:t>
+              <a:t>12.06.25</a:t>
             </a:fld>
             <a:endParaRPr lang="de-DE" dirty="0"/>
           </a:p>
@@ -2529,7 +2529,7 @@
             <a:fld id="{207F274F-E4AE-45D1-8462-735FF203E3CB}" type="datetime1">
               <a:rPr lang="de-DE" smtClean="0"/>
               <a:pPr/>
-              <a:t>30.05.25</a:t>
+              <a:t>12.06.25</a:t>
             </a:fld>
             <a:endParaRPr lang="de-DE" dirty="0"/>
           </a:p>
@@ -2723,7 +2723,7 @@
             <a:fld id="{207F274F-E4AE-45D1-8462-735FF203E3CB}" type="datetime1">
               <a:rPr lang="de-DE" smtClean="0"/>
               <a:pPr/>
-              <a:t>30.05.25</a:t>
+              <a:t>12.06.25</a:t>
             </a:fld>
             <a:endParaRPr lang="de-DE" dirty="0"/>
           </a:p>
@@ -2930,7 +2930,7 @@
             <a:fld id="{207F274F-E4AE-45D1-8462-735FF203E3CB}" type="datetime1">
               <a:rPr lang="de-DE" smtClean="0"/>
               <a:pPr/>
-              <a:t>30.05.25</a:t>
+              <a:t>12.06.25</a:t>
             </a:fld>
             <a:endParaRPr lang="de-DE" dirty="0"/>
           </a:p>
@@ -4616,7 +4616,7 @@
             <a:fld id="{207F274F-E4AE-45D1-8462-735FF203E3CB}" type="datetime1">
               <a:rPr lang="de-DE" smtClean="0"/>
               <a:pPr/>
-              <a:t>30.05.25</a:t>
+              <a:t>12.06.25</a:t>
             </a:fld>
             <a:endParaRPr lang="de-DE" dirty="0"/>
           </a:p>
@@ -5051,7 +5051,7 @@
             <a:fld id="{207F274F-E4AE-45D1-8462-735FF203E3CB}" type="datetime1">
               <a:rPr lang="de-DE" smtClean="0"/>
               <a:pPr/>
-              <a:t>30.05.25</a:t>
+              <a:t>12.06.25</a:t>
             </a:fld>
             <a:endParaRPr lang="de-DE" dirty="0"/>
           </a:p>
@@ -5411,7 +5411,7 @@
             <a:fld id="{207F274F-E4AE-45D1-8462-735FF203E3CB}" type="datetime1">
               <a:rPr lang="de-DE" smtClean="0"/>
               <a:pPr/>
-              <a:t>30.05.25</a:t>
+              <a:t>12.06.25</a:t>
             </a:fld>
             <a:endParaRPr lang="de-DE" dirty="0"/>
           </a:p>
@@ -5811,7 +5811,7 @@
             <a:fld id="{207F274F-E4AE-45D1-8462-735FF203E3CB}" type="datetime1">
               <a:rPr lang="de-DE" smtClean="0"/>
               <a:pPr/>
-              <a:t>30.05.25</a:t>
+              <a:t>12.06.25</a:t>
             </a:fld>
             <a:endParaRPr lang="de-DE" dirty="0"/>
           </a:p>
@@ -6212,7 +6212,7 @@
             <a:fld id="{207F274F-E4AE-45D1-8462-735FF203E3CB}" type="datetime1">
               <a:rPr lang="de-DE" smtClean="0"/>
               <a:pPr/>
-              <a:t>30.05.25</a:t>
+              <a:t>12.06.25</a:t>
             </a:fld>
             <a:endParaRPr lang="de-DE" dirty="0"/>
           </a:p>
@@ -6727,7 +6727,7 @@
             <a:fld id="{207F274F-E4AE-45D1-8462-735FF203E3CB}" type="datetime1">
               <a:rPr lang="de-DE" smtClean="0"/>
               <a:pPr/>
-              <a:t>30.05.25</a:t>
+              <a:t>12.06.25</a:t>
             </a:fld>
             <a:endParaRPr lang="de-DE" dirty="0"/>
           </a:p>
@@ -7127,7 +7127,7 @@
             <a:fld id="{207F274F-E4AE-45D1-8462-735FF203E3CB}" type="datetime1">
               <a:rPr lang="de-DE" smtClean="0"/>
               <a:pPr/>
-              <a:t>30.05.25</a:t>
+              <a:t>12.06.25</a:t>
             </a:fld>
             <a:endParaRPr lang="de-DE" dirty="0"/>
           </a:p>
@@ -7471,7 +7471,7 @@
             <a:fld id="{207F274F-E4AE-45D1-8462-735FF203E3CB}" type="datetime1">
               <a:rPr lang="de-DE" smtClean="0"/>
               <a:pPr/>
-              <a:t>30.05.25</a:t>
+              <a:t>12.06.25</a:t>
             </a:fld>
             <a:endParaRPr lang="de-DE" dirty="0"/>
           </a:p>
@@ -7857,7 +7857,7 @@
             <a:fld id="{207F274F-E4AE-45D1-8462-735FF203E3CB}" type="datetime1">
               <a:rPr lang="de-DE" smtClean="0"/>
               <a:pPr/>
-              <a:t>30.05.25</a:t>
+              <a:t>12.06.25</a:t>
             </a:fld>
             <a:endParaRPr lang="de-DE" dirty="0"/>
           </a:p>
@@ -8296,7 +8296,7 @@
             <a:fld id="{207F274F-E4AE-45D1-8462-735FF203E3CB}" type="datetime1">
               <a:rPr lang="de-DE" smtClean="0"/>
               <a:pPr/>
-              <a:t>30.05.25</a:t>
+              <a:t>12.06.25</a:t>
             </a:fld>
             <a:endParaRPr lang="de-DE" dirty="0"/>
           </a:p>
@@ -8893,7 +8893,7 @@
             <a:fld id="{7299ED31-B6BD-4CFC-8C77-58961B6150E5}" type="datetime1">
               <a:rPr lang="de-DE" smtClean="0"/>
               <a:pPr/>
-              <a:t>30.05.25</a:t>
+              <a:t>12.06.25</a:t>
             </a:fld>
             <a:endParaRPr lang="de-DE"/>
           </a:p>
@@ -9285,7 +9285,13 @@
       </p:sp>
       <p:pic>
         <p:nvPicPr>
-          <p:cNvPr id="18" name="Picture Placeholder 16" descr="Male profile outline"/>
+          <p:cNvPr id="5" name="Picture 4" descr="A person smiling at camera&#10;&#10;AI-generated content may be incorrect.">
+            <a:extLst>
+              <a:ext uri="{FF2B5EF4-FFF2-40B4-BE49-F238E27FC236}">
+                <a16:creationId xmlns:a16="http://schemas.microsoft.com/office/drawing/2014/main" id="{B9ED19D2-546E-88F5-FC35-92F22B7832CC}"/>
+              </a:ext>
+            </a:extLst>
+          </p:cNvPr>
           <p:cNvPicPr>
             <a:picLocks noChangeAspect="1"/>
           </p:cNvPicPr>
@@ -9294,18 +9300,19 @@
         <p:blipFill>
           <a:blip r:embed="rId3">
             <a:extLst>
-              <a:ext uri="{96DAC541-7B7A-43D3-8B79-37D633B846F1}">
-                <asvg:svgBlip xmlns:asvg="http://schemas.microsoft.com/office/drawing/2016/SVG/main" r:embed="rId4"/>
+              <a:ext uri="{28A0092B-C50C-407E-A947-70E740481C1C}">
+                <a14:useLocalDpi xmlns:a14="http://schemas.microsoft.com/office/drawing/2010/main" val="0"/>
               </a:ext>
             </a:extLst>
           </a:blip>
-          <a:srcRect l="11870" r="11870"/>
-          <a:stretch/>
+          <a:stretch>
+            <a:fillRect/>
+          </a:stretch>
         </p:blipFill>
-        <p:spPr bwMode="gray">
+        <p:spPr>
           <a:xfrm>
-            <a:off x="3203810" y="1196752"/>
-            <a:ext cx="1152525" cy="1511300"/>
+            <a:off x="3411536" y="1511695"/>
+            <a:ext cx="1016447" cy="1214778"/>
           </a:xfrm>
           <a:prstGeom prst="rect">
             <a:avLst/>
@@ -9363,7 +9370,7 @@
             <a:fld id="{7299ED31-B6BD-4CFC-8C77-58961B6150E5}" type="datetime1">
               <a:rPr lang="de-DE" smtClean="0"/>
               <a:pPr/>
-              <a:t>30.05.25</a:t>
+              <a:t>12.06.25</a:t>
             </a:fld>
             <a:endParaRPr lang="de-DE"/>
           </a:p>
@@ -9749,53 +9756,6 @@
           </a:p>
         </p:txBody>
       </p:sp>
-      <p:pic>
-        <p:nvPicPr>
-          <p:cNvPr id="18" name="Picture Placeholder 16" descr="Male profile outline"/>
-          <p:cNvPicPr>
-            <a:picLocks noChangeAspect="1"/>
-          </p:cNvPicPr>
-          <p:nvPr/>
-        </p:nvPicPr>
-        <p:blipFill>
-          <a:blip r:embed="rId4">
-            <a:extLst>
-              <a:ext uri="{96DAC541-7B7A-43D3-8B79-37D633B846F1}">
-                <asvg:svgBlip xmlns:asvg="http://schemas.microsoft.com/office/drawing/2016/SVG/main" r:embed="rId5"/>
-              </a:ext>
-            </a:extLst>
-          </a:blip>
-          <a:srcRect l="11870" r="11870"/>
-          <a:stretch/>
-        </p:blipFill>
-        <p:spPr bwMode="gray">
-          <a:xfrm>
-            <a:off x="3203810" y="1196752"/>
-            <a:ext cx="1152525" cy="1511300"/>
-          </a:xfrm>
-          <a:prstGeom prst="rect">
-            <a:avLst/>
-          </a:prstGeom>
-          <a:solidFill>
-            <a:schemeClr val="accent2"/>
-          </a:solidFill>
-          <a:ln w="9525">
-            <a:solidFill>
-              <a:schemeClr val="bg1"/>
-            </a:solidFill>
-            <a:miter lim="800000"/>
-            <a:headEnd/>
-            <a:tailEnd/>
-          </a:ln>
-          <a:effectLst>
-            <a:outerShdw blurRad="50800" dist="38100" dir="2700000" algn="tl" rotWithShape="0">
-              <a:prstClr val="black">
-                <a:alpha val="40000"/>
-              </a:prstClr>
-            </a:outerShdw>
-          </a:effectLst>
-        </p:spPr>
-      </p:pic>
       <p:grpSp>
         <p:nvGrpSpPr>
           <p:cNvPr id="14" name="Gruppieren 13"/>
@@ -9981,6 +9941,42 @@
           </p:spPr>
         </p:cxnSp>
       </p:grpSp>
+      <p:pic>
+        <p:nvPicPr>
+          <p:cNvPr id="5" name="Picture 4" descr="A person smiling at camera&#10;&#10;AI-generated content may be incorrect.">
+            <a:extLst>
+              <a:ext uri="{FF2B5EF4-FFF2-40B4-BE49-F238E27FC236}">
+                <a16:creationId xmlns:a16="http://schemas.microsoft.com/office/drawing/2014/main" id="{95B704FB-0B4E-B008-175E-62450F6C8A0C}"/>
+              </a:ext>
+            </a:extLst>
+          </p:cNvPr>
+          <p:cNvPicPr>
+            <a:picLocks noChangeAspect="1"/>
+          </p:cNvPicPr>
+          <p:nvPr/>
+        </p:nvPicPr>
+        <p:blipFill>
+          <a:blip r:embed="rId4">
+            <a:extLst>
+              <a:ext uri="{28A0092B-C50C-407E-A947-70E740481C1C}">
+                <a14:useLocalDpi xmlns:a14="http://schemas.microsoft.com/office/drawing/2010/main" val="0"/>
+              </a:ext>
+            </a:extLst>
+          </a:blip>
+          <a:stretch>
+            <a:fillRect/>
+          </a:stretch>
+        </p:blipFill>
+        <p:spPr>
+          <a:xfrm>
+            <a:off x="3275856" y="1293812"/>
+            <a:ext cx="1123818" cy="1343099"/>
+          </a:xfrm>
+          <a:prstGeom prst="rect">
+            <a:avLst/>
+          </a:prstGeom>
+        </p:spPr>
+      </p:pic>
     </p:spTree>
     <p:extLst>
       <p:ext uri="{BB962C8B-B14F-4D97-AF65-F5344CB8AC3E}">
@@ -10405,7 +10401,7 @@
             <a:fld id="{7299ED31-B6BD-4CFC-8C77-58961B6150E5}" type="datetime1">
               <a:rPr lang="de-DE" smtClean="0"/>
               <a:pPr/>
-              <a:t>30.05.25</a:t>
+              <a:t>12.06.25</a:t>
             </a:fld>
             <a:endParaRPr lang="de-DE" dirty="0"/>
           </a:p>
@@ -11470,6 +11466,33 @@
 </file>
 
 <file path=customXml/item1.xml><?xml version="1.0" encoding="utf-8"?>
+<?mso-contentType ?>
+<FormTemplates xmlns="http://schemas.microsoft.com/sharepoint/v3/contenttype/forms">
+  <Display>DocumentLibraryForm</Display>
+  <Edit>DocumentLibraryForm</Edit>
+  <New>DocumentLibraryForm</New>
+</FormTemplates>
+</file>
+
+<file path=customXml/item2.xml><?xml version="1.0" encoding="utf-8"?>
+<p:properties xmlns:p="http://schemas.microsoft.com/office/2006/metadata/properties" xmlns:xsi="http://www.w3.org/2001/XMLSchema-instance" xmlns:pc="http://schemas.microsoft.com/office/infopath/2007/PartnerControls">
+  <documentManagement>
+    <TaxCatchAll xmlns="f247cc86-41ce-4e54-895f-61d07d03751e" xsi:nil="true"/>
+    <lcf76f155ced4ddcb4097134ff3c332f xmlns="c70c37c3-6fe6-4316-bb79-6c535e774478">
+      <Terms xmlns="http://schemas.microsoft.com/office/infopath/2007/PartnerControls"/>
+    </lcf76f155ced4ddcb4097134ff3c332f>
+    <Personen xmlns="c70c37c3-6fe6-4316-bb79-6c535e774478">
+      <UserInfo>
+        <DisplayName/>
+        <AccountId xsi:nil="true"/>
+        <AccountType/>
+      </UserInfo>
+    </Personen>
+  </documentManagement>
+</p:properties>
+</file>
+
+<file path=customXml/item3.xml><?xml version="1.0" encoding="utf-8"?>
 <ct:contentTypeSchema xmlns:ct="http://schemas.microsoft.com/office/2006/metadata/contentType" xmlns:ma="http://schemas.microsoft.com/office/2006/metadata/properties/metaAttributes" ct:_="" ma:_="" ma:contentTypeName="Dokument" ma:contentTypeID="0x010100ED369A2B9592B44C89D12E69AC892C99" ma:contentTypeVersion="12" ma:contentTypeDescription="Ein neues Dokument erstellen." ma:contentTypeScope="" ma:versionID="c9dab8326fc9122a30f2ddef095df6ab">
   <xsd:schema xmlns:xsd="http://www.w3.org/2001/XMLSchema" xmlns:xs="http://www.w3.org/2001/XMLSchema" xmlns:p="http://schemas.microsoft.com/office/2006/metadata/properties" xmlns:ns2="c70c37c3-6fe6-4316-bb79-6c535e774478" xmlns:ns3="f247cc86-41ce-4e54-895f-61d07d03751e" targetNamespace="http://schemas.microsoft.com/office/2006/metadata/properties" ma:root="true" ma:fieldsID="1b0673540b584560623b52e843080132" ns2:_="" ns3:_="">
     <xsd:import namespace="c70c37c3-6fe6-4316-bb79-6c535e774478"/>
@@ -11698,34 +11721,26 @@
 </ct:contentTypeSchema>
 </file>
 
-<file path=customXml/item2.xml><?xml version="1.0" encoding="utf-8"?>
-<p:properties xmlns:p="http://schemas.microsoft.com/office/2006/metadata/properties" xmlns:xsi="http://www.w3.org/2001/XMLSchema-instance" xmlns:pc="http://schemas.microsoft.com/office/infopath/2007/PartnerControls">
-  <documentManagement>
-    <TaxCatchAll xmlns="f247cc86-41ce-4e54-895f-61d07d03751e" xsi:nil="true"/>
-    <lcf76f155ced4ddcb4097134ff3c332f xmlns="c70c37c3-6fe6-4316-bb79-6c535e774478">
-      <Terms xmlns="http://schemas.microsoft.com/office/infopath/2007/PartnerControls"/>
-    </lcf76f155ced4ddcb4097134ff3c332f>
-    <Personen xmlns="c70c37c3-6fe6-4316-bb79-6c535e774478">
-      <UserInfo>
-        <DisplayName/>
-        <AccountId xsi:nil="true"/>
-        <AccountType/>
-      </UserInfo>
-    </Personen>
-  </documentManagement>
-</p:properties>
+<file path=customXml/itemProps1.xml><?xml version="1.0" encoding="utf-8"?>
+<ds:datastoreItem xmlns:ds="http://schemas.openxmlformats.org/officeDocument/2006/customXml" ds:itemID="{4E4A2F5E-6241-477A-B193-D58387B42D38}">
+  <ds:schemaRefs>
+    <ds:schemaRef ds:uri="http://schemas.microsoft.com/sharepoint/v3/contenttype/forms"/>
+  </ds:schemaRefs>
+</ds:datastoreItem>
 </file>
 
-<file path=customXml/item3.xml><?xml version="1.0" encoding="utf-8"?>
-<?mso-contentType ?>
-<FormTemplates xmlns="http://schemas.microsoft.com/sharepoint/v3/contenttype/forms">
-  <Display>DocumentLibraryForm</Display>
-  <Edit>DocumentLibraryForm</Edit>
-  <New>DocumentLibraryForm</New>
-</FormTemplates>
+<file path=customXml/itemProps2.xml><?xml version="1.0" encoding="utf-8"?>
+<ds:datastoreItem xmlns:ds="http://schemas.openxmlformats.org/officeDocument/2006/customXml" ds:itemID="{E2084FCE-6ACD-4C34-A688-7C1ED51AAD6C}">
+  <ds:schemaRefs>
+    <ds:schemaRef ds:uri="http://schemas.microsoft.com/office/2006/metadata/properties"/>
+    <ds:schemaRef ds:uri="http://schemas.microsoft.com/office/infopath/2007/PartnerControls"/>
+    <ds:schemaRef ds:uri="f247cc86-41ce-4e54-895f-61d07d03751e"/>
+    <ds:schemaRef ds:uri="c70c37c3-6fe6-4316-bb79-6c535e774478"/>
+  </ds:schemaRefs>
+</ds:datastoreItem>
 </file>
 
-<file path=customXml/itemProps1.xml><?xml version="1.0" encoding="utf-8"?>
+<file path=customXml/itemProps3.xml><?xml version="1.0" encoding="utf-8"?>
 <ds:datastoreItem xmlns:ds="http://schemas.openxmlformats.org/officeDocument/2006/customXml" ds:itemID="{B449B82B-8938-467C-9623-A9133BF777A1}">
   <ds:schemaRefs>
     <ds:schemaRef ds:uri="http://schemas.microsoft.com/office/2006/metadata/contentType"/>
@@ -11742,23 +11757,4 @@
     <ds:schemaRef ds:uri="http://schemas.microsoft.com/internal/obd"/>
   </ds:schemaRefs>
 </ds:datastoreItem>
-</file>
-
-<file path=customXml/itemProps2.xml><?xml version="1.0" encoding="utf-8"?>
-<ds:datastoreItem xmlns:ds="http://schemas.openxmlformats.org/officeDocument/2006/customXml" ds:itemID="{E2084FCE-6ACD-4C34-A688-7C1ED51AAD6C}">
-  <ds:schemaRefs>
-    <ds:schemaRef ds:uri="http://schemas.microsoft.com/office/2006/metadata/properties"/>
-    <ds:schemaRef ds:uri="http://schemas.microsoft.com/office/infopath/2007/PartnerControls"/>
-    <ds:schemaRef ds:uri="f247cc86-41ce-4e54-895f-61d07d03751e"/>
-    <ds:schemaRef ds:uri="c70c37c3-6fe6-4316-bb79-6c535e774478"/>
-  </ds:schemaRefs>
-</ds:datastoreItem>
-</file>
-
-<file path=customXml/itemProps3.xml><?xml version="1.0" encoding="utf-8"?>
-<ds:datastoreItem xmlns:ds="http://schemas.openxmlformats.org/officeDocument/2006/customXml" ds:itemID="{4E4A2F5E-6241-477A-B193-D58387B42D38}">
-  <ds:schemaRefs>
-    <ds:schemaRef ds:uri="http://schemas.microsoft.com/sharepoint/v3/contenttype/forms"/>
-  </ds:schemaRefs>
-</ds:datastoreItem>
 </file>
</xml_diff>